<commit_message>
Add presentation slides for task 2.1
</commit_message>
<xml_diff>
--- a/Task-2/TIES4560 Task 2.pptx
+++ b/Task-2/TIES4560 Task 2.pptx
@@ -5,16 +5,17 @@
     <p:sldMasterId id="2147483708" r:id="rId1"/>
   </p:sldMasterIdLst>
   <p:notesMasterIdLst>
-    <p:notesMasterId r:id="rId6"/>
+    <p:notesMasterId r:id="rId7"/>
   </p:notesMasterIdLst>
   <p:handoutMasterIdLst>
-    <p:handoutMasterId r:id="rId7"/>
+    <p:handoutMasterId r:id="rId8"/>
   </p:handoutMasterIdLst>
   <p:sldIdLst>
     <p:sldId id="257" r:id="rId2"/>
     <p:sldId id="259" r:id="rId3"/>
-    <p:sldId id="258" r:id="rId4"/>
-    <p:sldId id="260" r:id="rId5"/>
+    <p:sldId id="261" r:id="rId4"/>
+    <p:sldId id="258" r:id="rId5"/>
+    <p:sldId id="260" r:id="rId6"/>
   </p:sldIdLst>
   <p:sldSz cx="12192000" cy="6858000"/>
   <p:notesSz cx="6858000" cy="9144000"/>
@@ -114,6 +115,23 @@
     </a:lvl9pPr>
   </p:defaultTextStyle>
   <p:extLst>
+    <p:ext uri="{521415D9-36F7-43E2-AB2F-B90AF26B5E84}">
+      <p14:sectionLst xmlns:p14="http://schemas.microsoft.com/office/powerpoint/2010/main">
+        <p14:section name="Oletusosa" id="{13AF3E40-3CFF-4B27-81F9-A9F88BAB2BFE}">
+          <p14:sldIdLst>
+            <p14:sldId id="257"/>
+          </p14:sldIdLst>
+        </p14:section>
+        <p14:section name="Nimetön osa" id="{5F153FE1-BC1F-4E38-A214-A9B93996DE66}">
+          <p14:sldIdLst>
+            <p14:sldId id="259"/>
+            <p14:sldId id="261"/>
+            <p14:sldId id="258"/>
+            <p14:sldId id="260"/>
+          </p14:sldIdLst>
+        </p14:section>
+      </p14:sectionLst>
+    </p:ext>
     <p:ext uri="{EFAFB233-063F-42B5-8137-9DF3F51BA10A}">
       <p15:sldGuideLst xmlns:p15="http://schemas.microsoft.com/office/powerpoint/2012/main">
         <p15:guide id="1" orient="horz" pos="2160" userDrawn="1">
@@ -229,7 +247,7 @@
             <a:pPr rtl="0"/>
             <a:fld id="{742F5470-9300-4F01-BAE4-EC85CF7D996E}" type="datetime1">
               <a:rPr lang="fi-FI" smtClean="0"/>
-              <a:t>17.9.2018</a:t>
+              <a:t>19.9.2018</a:t>
             </a:fld>
             <a:endParaRPr lang="fi-FI" dirty="0"/>
           </a:p>
@@ -399,7 +417,7 @@
             <a:pPr rtl="0"/>
             <a:fld id="{BD7AAC5D-D132-405C-B1C3-7E7300BBD672}" type="datetime1">
               <a:rPr lang="fi-FI" noProof="0" smtClean="0"/>
-              <a:t>17.9.2018</a:t>
+              <a:t>19.9.2018</a:t>
             </a:fld>
             <a:endParaRPr lang="fi-FI" noProof="0" dirty="0"/>
           </a:p>
@@ -839,7 +857,7 @@
             <a:pPr rtl="0"/>
             <a:fld id="{CF2FD335-6D8E-486A-8F5F-DFC7325903FF}" type="slidenum">
               <a:rPr lang="fi-FI" smtClean="0"/>
-              <a:t>3</a:t>
+              <a:t>4</a:t>
             </a:fld>
             <a:endParaRPr lang="fi-FI" dirty="0"/>
           </a:p>
@@ -1085,7 +1103,7 @@
             <a:pPr rtl="0"/>
             <a:fld id="{2AD6E8FD-F7D7-41B4-8999-F346B70E2546}" type="datetime1">
               <a:rPr lang="fi-FI" noProof="0" smtClean="0"/>
-              <a:t>17.9.2018</a:t>
+              <a:t>19.9.2018</a:t>
             </a:fld>
             <a:endParaRPr lang="fi-FI" noProof="0" dirty="0"/>
           </a:p>
@@ -1312,7 +1330,7 @@
             <a:pPr rtl="0"/>
             <a:fld id="{09603DF7-87BD-4AFD-B0D8-FF7DA1FF7693}" type="datetime1">
               <a:rPr lang="fi-FI" noProof="0" smtClean="0"/>
-              <a:t>17.9.2018</a:t>
+              <a:t>19.9.2018</a:t>
             </a:fld>
             <a:endParaRPr lang="fi-FI" noProof="0" dirty="0"/>
           </a:p>
@@ -1576,7 +1594,7 @@
             <a:pPr rtl="0"/>
             <a:fld id="{09603DF7-87BD-4AFD-B0D8-FF7DA1FF7693}" type="datetime1">
               <a:rPr lang="fi-FI" noProof="0" smtClean="0"/>
-              <a:t>17.9.2018</a:t>
+              <a:t>19.9.2018</a:t>
             </a:fld>
             <a:endParaRPr lang="fi-FI" noProof="0" dirty="0"/>
           </a:p>
@@ -1758,7 +1776,7 @@
             <a:pPr rtl="0"/>
             <a:fld id="{36ECB4F8-557B-43CB-ACA7-6C92F8E4E511}" type="datetime1">
               <a:rPr lang="fi-FI" noProof="0" smtClean="0"/>
-              <a:t>17.9.2018</a:t>
+              <a:t>19.9.2018</a:t>
             </a:fld>
             <a:endParaRPr lang="fi-FI" noProof="0" dirty="0"/>
           </a:p>
@@ -2120,7 +2138,7 @@
             <a:pPr rtl="0"/>
             <a:fld id="{09603DF7-87BD-4AFD-B0D8-FF7DA1FF7693}" type="datetime1">
               <a:rPr lang="fi-FI" noProof="0" smtClean="0"/>
-              <a:t>17.9.2018</a:t>
+              <a:t>19.9.2018</a:t>
             </a:fld>
             <a:endParaRPr lang="fi-FI" noProof="0" dirty="0"/>
           </a:p>
@@ -2403,7 +2421,7 @@
             <a:pPr rtl="0"/>
             <a:fld id="{3A6F87A2-C6E6-483E-8C00-4E1495CB4C6E}" type="datetime1">
               <a:rPr lang="fi-FI" noProof="0" smtClean="0"/>
-              <a:t>17.9.2018</a:t>
+              <a:t>19.9.2018</a:t>
             </a:fld>
             <a:endParaRPr lang="fi-FI" noProof="0" dirty="0"/>
           </a:p>
@@ -2817,7 +2835,7 @@
             <a:pPr rtl="0"/>
             <a:fld id="{C52CDCD2-0EBA-4DFC-88B9-04B2757FE872}" type="datetime1">
               <a:rPr lang="fi-FI" noProof="0" smtClean="0"/>
-              <a:t>17.9.2018</a:t>
+              <a:t>19.9.2018</a:t>
             </a:fld>
             <a:endParaRPr lang="fi-FI" noProof="0" dirty="0"/>
           </a:p>
@@ -2954,7 +2972,7 @@
             <a:pPr rtl="0"/>
             <a:fld id="{89281AC1-AAB7-4E6C-971E-4E33DDF198C1}" type="datetime1">
               <a:rPr lang="fi-FI" noProof="0" smtClean="0"/>
-              <a:t>17.9.2018</a:t>
+              <a:t>19.9.2018</a:t>
             </a:fld>
             <a:endParaRPr lang="fi-FI" noProof="0" dirty="0"/>
           </a:p>
@@ -3144,7 +3162,7 @@
             <a:pPr rtl="0"/>
             <a:fld id="{CD91315A-3B04-4B60-B9D9-94D874790851}" type="datetime1">
               <a:rPr lang="fi-FI" noProof="0" smtClean="0"/>
-              <a:t>17.9.2018</a:t>
+              <a:t>19.9.2018</a:t>
             </a:fld>
             <a:endParaRPr lang="fi-FI" noProof="0" dirty="0"/>
           </a:p>
@@ -3517,7 +3535,7 @@
             <a:pPr rtl="0"/>
             <a:fld id="{177B2761-9052-47E7-A879-08FC02F16AE2}" type="datetime1">
               <a:rPr lang="fi-FI" noProof="0" smtClean="0"/>
-              <a:t>17.9.2018</a:t>
+              <a:t>19.9.2018</a:t>
             </a:fld>
             <a:endParaRPr lang="fi-FI" noProof="0" dirty="0"/>
           </a:p>
@@ -3918,7 +3936,7 @@
             <a:pPr rtl="0"/>
             <a:fld id="{09603DF7-87BD-4AFD-B0D8-FF7DA1FF7693}" type="datetime1">
               <a:rPr lang="fi-FI" noProof="0" smtClean="0"/>
-              <a:t>17.9.2018</a:t>
+              <a:t>19.9.2018</a:t>
             </a:fld>
             <a:endParaRPr lang="fi-FI" noProof="0" dirty="0"/>
           </a:p>
@@ -4213,7 +4231,7 @@
             <a:pPr rtl="0"/>
             <a:fld id="{09603DF7-87BD-4AFD-B0D8-FF7DA1FF7693}" type="datetime1">
               <a:rPr lang="fi-FI" noProof="0" smtClean="0"/>
-              <a:t>17.9.2018</a:t>
+              <a:t>19.9.2018</a:t>
             </a:fld>
             <a:endParaRPr lang="fi-FI" noProof="0" dirty="0"/>
           </a:p>
@@ -4826,7 +4844,12 @@
             <p:ph type="subTitle" idx="1"/>
           </p:nvPr>
         </p:nvSpPr>
-        <p:spPr/>
+        <p:spPr>
+          <a:xfrm>
+            <a:off x="947956" y="4455620"/>
+            <a:ext cx="10210495" cy="1143000"/>
+          </a:xfrm>
+        </p:spPr>
         <p:txBody>
           <a:bodyPr rtlCol="0"/>
           <a:lstStyle/>
@@ -4858,7 +4881,7 @@
             </a:r>
             <a:r>
               <a:rPr lang="fi-FI" dirty="0"/>
-              <a:t> ja </a:t>
+              <a:t> AND </a:t>
             </a:r>
             <a:r>
               <a:rPr lang="fi-FI" dirty="0" err="1"/>
@@ -4971,7 +4994,430 @@
           <a:bodyPr/>
           <a:lstStyle/>
           <a:p>
-            <a:endParaRPr lang="fi-FI"/>
+            <a:r>
+              <a:rPr lang="fi-FI" dirty="0" err="1"/>
+              <a:t>The</a:t>
+            </a:r>
+            <a:r>
+              <a:rPr lang="fi-FI" dirty="0"/>
+              <a:t> </a:t>
+            </a:r>
+            <a:r>
+              <a:rPr lang="fi-FI" dirty="0" err="1"/>
+              <a:t>project</a:t>
+            </a:r>
+            <a:r>
+              <a:rPr lang="fi-FI" dirty="0"/>
+              <a:t> </a:t>
+            </a:r>
+            <a:r>
+              <a:rPr lang="fi-FI" dirty="0" err="1"/>
+              <a:t>consists</a:t>
+            </a:r>
+            <a:r>
+              <a:rPr lang="fi-FI" dirty="0"/>
+              <a:t> of a </a:t>
+            </a:r>
+            <a:r>
+              <a:rPr lang="fi-FI" dirty="0" err="1"/>
+              <a:t>Jetty</a:t>
+            </a:r>
+            <a:r>
+              <a:rPr lang="fi-FI" dirty="0"/>
+              <a:t> Web Server </a:t>
+            </a:r>
+            <a:r>
+              <a:rPr lang="fi-FI" dirty="0" err="1"/>
+              <a:t>with</a:t>
+            </a:r>
+            <a:r>
+              <a:rPr lang="fi-FI" dirty="0"/>
+              <a:t> </a:t>
+            </a:r>
+            <a:r>
+              <a:rPr lang="fi-FI" dirty="0" err="1"/>
+              <a:t>Servlets</a:t>
+            </a:r>
+            <a:r>
+              <a:rPr lang="fi-FI" dirty="0"/>
+              <a:t> </a:t>
+            </a:r>
+            <a:r>
+              <a:rPr lang="fi-FI" dirty="0" err="1"/>
+              <a:t>that</a:t>
+            </a:r>
+            <a:r>
+              <a:rPr lang="fi-FI" dirty="0"/>
+              <a:t> </a:t>
+            </a:r>
+            <a:r>
+              <a:rPr lang="fi-FI" dirty="0" err="1"/>
+              <a:t>utilize</a:t>
+            </a:r>
+            <a:r>
+              <a:rPr lang="fi-FI" dirty="0"/>
+              <a:t> a SOAP web </a:t>
+            </a:r>
+            <a:r>
+              <a:rPr lang="fi-FI" dirty="0" err="1"/>
+              <a:t>service</a:t>
+            </a:r>
+            <a:r>
+              <a:rPr lang="fi-FI" dirty="0"/>
+              <a:t> to </a:t>
+            </a:r>
+            <a:r>
+              <a:rPr lang="fi-FI" dirty="0" err="1"/>
+              <a:t>generate</a:t>
+            </a:r>
+            <a:r>
+              <a:rPr lang="fi-FI" dirty="0"/>
+              <a:t> </a:t>
+            </a:r>
+            <a:r>
+              <a:rPr lang="fi-FI" dirty="0" err="1"/>
+              <a:t>fictional</a:t>
+            </a:r>
+            <a:r>
+              <a:rPr lang="fi-FI" dirty="0"/>
+              <a:t> </a:t>
+            </a:r>
+            <a:r>
+              <a:rPr lang="fi-FI" dirty="0" err="1"/>
+              <a:t>names</a:t>
+            </a:r>
+            <a:r>
+              <a:rPr lang="fi-FI" dirty="0"/>
+              <a:t> for </a:t>
+            </a:r>
+            <a:r>
+              <a:rPr lang="fi-FI" dirty="0" err="1"/>
+              <a:t>fantasy</a:t>
+            </a:r>
+            <a:r>
+              <a:rPr lang="fi-FI" dirty="0"/>
+              <a:t> </a:t>
+            </a:r>
+            <a:r>
+              <a:rPr lang="fi-FI" dirty="0" err="1"/>
+              <a:t>characters</a:t>
+            </a:r>
+            <a:r>
+              <a:rPr lang="fi-FI" dirty="0"/>
+              <a:t>.</a:t>
+            </a:r>
+          </a:p>
+          <a:p>
+            <a:pPr>
+              <a:buFont typeface="Arial" panose="020B0604020202020204" pitchFamily="34" charset="0"/>
+              <a:buChar char="•"/>
+            </a:pPr>
+            <a:endParaRPr lang="fi-FI" dirty="0"/>
+          </a:p>
+          <a:p>
+            <a:pPr>
+              <a:buFont typeface="Arial" panose="020B0604020202020204" pitchFamily="34" charset="0"/>
+              <a:buChar char="•"/>
+            </a:pPr>
+            <a:r>
+              <a:rPr lang="fi-FI" dirty="0"/>
+              <a:t> </a:t>
+            </a:r>
+            <a:r>
+              <a:rPr lang="fi-FI" dirty="0" err="1"/>
+              <a:t>The</a:t>
+            </a:r>
+            <a:r>
+              <a:rPr lang="fi-FI" dirty="0"/>
+              <a:t> SOAP web </a:t>
+            </a:r>
+            <a:r>
+              <a:rPr lang="fi-FI" dirty="0" err="1"/>
+              <a:t>service</a:t>
+            </a:r>
+            <a:r>
+              <a:rPr lang="fi-FI" dirty="0"/>
+              <a:t> </a:t>
+            </a:r>
+            <a:r>
+              <a:rPr lang="fi-FI" dirty="0" err="1"/>
+              <a:t>generates</a:t>
+            </a:r>
+            <a:r>
+              <a:rPr lang="fi-FI" dirty="0"/>
+              <a:t> </a:t>
+            </a:r>
+            <a:r>
+              <a:rPr lang="fi-FI" dirty="0" err="1"/>
+              <a:t>names</a:t>
+            </a:r>
+            <a:r>
+              <a:rPr lang="fi-FI" dirty="0"/>
+              <a:t> </a:t>
+            </a:r>
+            <a:r>
+              <a:rPr lang="fi-FI" dirty="0" err="1"/>
+              <a:t>based</a:t>
+            </a:r>
+            <a:r>
+              <a:rPr lang="fi-FI" dirty="0"/>
+              <a:t> on </a:t>
+            </a:r>
+            <a:r>
+              <a:rPr lang="fi-FI" dirty="0" err="1"/>
+              <a:t>given</a:t>
+            </a:r>
+            <a:r>
+              <a:rPr lang="fi-FI" dirty="0"/>
+              <a:t> </a:t>
+            </a:r>
+            <a:r>
+              <a:rPr lang="fi-FI" dirty="0" err="1"/>
+              <a:t>parameters</a:t>
+            </a:r>
+            <a:r>
+              <a:rPr lang="fi-FI" dirty="0"/>
+              <a:t> (</a:t>
+            </a:r>
+            <a:r>
+              <a:rPr lang="fi-FI" dirty="0" err="1"/>
+              <a:t>gender</a:t>
+            </a:r>
+            <a:r>
+              <a:rPr lang="fi-FI" dirty="0"/>
+              <a:t> and </a:t>
+            </a:r>
+            <a:r>
+              <a:rPr lang="fi-FI" dirty="0" err="1"/>
+              <a:t>length</a:t>
+            </a:r>
+            <a:r>
+              <a:rPr lang="fi-FI" dirty="0"/>
+              <a:t>)</a:t>
+            </a:r>
+          </a:p>
+          <a:p>
+            <a:pPr>
+              <a:buFont typeface="Arial" panose="020B0604020202020204" pitchFamily="34" charset="0"/>
+              <a:buChar char="•"/>
+            </a:pPr>
+            <a:r>
+              <a:rPr lang="fi-FI" dirty="0"/>
+              <a:t> </a:t>
+            </a:r>
+            <a:r>
+              <a:rPr lang="fi-FI" dirty="0" err="1"/>
+              <a:t>The</a:t>
+            </a:r>
+            <a:r>
+              <a:rPr lang="fi-FI" dirty="0"/>
+              <a:t> </a:t>
+            </a:r>
+            <a:r>
+              <a:rPr lang="fi-FI" dirty="0" err="1"/>
+              <a:t>Jetty</a:t>
+            </a:r>
+            <a:r>
+              <a:rPr lang="fi-FI" dirty="0"/>
+              <a:t> Web Server </a:t>
+            </a:r>
+            <a:r>
+              <a:rPr lang="fi-FI" dirty="0" err="1"/>
+              <a:t>sends</a:t>
+            </a:r>
+            <a:r>
+              <a:rPr lang="fi-FI" dirty="0"/>
+              <a:t> </a:t>
+            </a:r>
+            <a:r>
+              <a:rPr lang="fi-FI" dirty="0" err="1"/>
+              <a:t>these</a:t>
+            </a:r>
+            <a:r>
+              <a:rPr lang="fi-FI" dirty="0"/>
+              <a:t> </a:t>
+            </a:r>
+            <a:r>
+              <a:rPr lang="fi-FI" dirty="0" err="1"/>
+              <a:t>parameters</a:t>
+            </a:r>
+            <a:r>
+              <a:rPr lang="fi-FI" dirty="0"/>
+              <a:t> to </a:t>
+            </a:r>
+            <a:r>
+              <a:rPr lang="fi-FI" dirty="0" err="1"/>
+              <a:t>the</a:t>
+            </a:r>
+            <a:r>
+              <a:rPr lang="fi-FI" dirty="0"/>
+              <a:t> SOAP WS </a:t>
+            </a:r>
+            <a:r>
+              <a:rPr lang="fi-FI" dirty="0" err="1"/>
+              <a:t>when</a:t>
+            </a:r>
+            <a:r>
+              <a:rPr lang="fi-FI" dirty="0"/>
+              <a:t> </a:t>
+            </a:r>
+            <a:r>
+              <a:rPr lang="fi-FI" dirty="0" err="1"/>
+              <a:t>the</a:t>
+            </a:r>
+            <a:r>
+              <a:rPr lang="fi-FI" dirty="0"/>
+              <a:t> </a:t>
+            </a:r>
+            <a:r>
+              <a:rPr lang="fi-FI" dirty="0" err="1"/>
+              <a:t>user</a:t>
+            </a:r>
+            <a:r>
+              <a:rPr lang="fi-FI" dirty="0"/>
+              <a:t> </a:t>
+            </a:r>
+            <a:r>
+              <a:rPr lang="fi-FI" dirty="0" err="1"/>
+              <a:t>requests</a:t>
+            </a:r>
+            <a:r>
+              <a:rPr lang="fi-FI" dirty="0"/>
+              <a:t> a </a:t>
+            </a:r>
+            <a:r>
+              <a:rPr lang="fi-FI" dirty="0" err="1"/>
+              <a:t>name</a:t>
+            </a:r>
+            <a:endParaRPr lang="fi-FI" dirty="0"/>
+          </a:p>
+          <a:p>
+            <a:pPr>
+              <a:buFont typeface="Arial" panose="020B0604020202020204" pitchFamily="34" charset="0"/>
+              <a:buChar char="•"/>
+            </a:pPr>
+            <a:r>
+              <a:rPr lang="fi-FI" dirty="0"/>
+              <a:t> </a:t>
+            </a:r>
+            <a:r>
+              <a:rPr lang="fi-FI" dirty="0" err="1"/>
+              <a:t>The</a:t>
+            </a:r>
+            <a:r>
+              <a:rPr lang="fi-FI" dirty="0"/>
+              <a:t> </a:t>
+            </a:r>
+            <a:r>
+              <a:rPr lang="fi-FI" dirty="0" err="1"/>
+              <a:t>user</a:t>
+            </a:r>
+            <a:r>
+              <a:rPr lang="fi-FI" dirty="0"/>
+              <a:t> </a:t>
+            </a:r>
+            <a:r>
+              <a:rPr lang="fi-FI" dirty="0" err="1"/>
+              <a:t>can</a:t>
+            </a:r>
+            <a:r>
+              <a:rPr lang="fi-FI" dirty="0"/>
+              <a:t> </a:t>
+            </a:r>
+            <a:r>
+              <a:rPr lang="fi-FI" dirty="0" err="1"/>
+              <a:t>modify</a:t>
+            </a:r>
+            <a:r>
+              <a:rPr lang="fi-FI" dirty="0"/>
+              <a:t> </a:t>
+            </a:r>
+            <a:r>
+              <a:rPr lang="fi-FI" dirty="0" err="1"/>
+              <a:t>these</a:t>
+            </a:r>
+            <a:r>
+              <a:rPr lang="fi-FI" dirty="0"/>
+              <a:t> </a:t>
+            </a:r>
+            <a:r>
+              <a:rPr lang="fi-FI" dirty="0" err="1"/>
+              <a:t>parameters</a:t>
+            </a:r>
+            <a:r>
+              <a:rPr lang="fi-FI" dirty="0"/>
+              <a:t> </a:t>
+            </a:r>
+            <a:r>
+              <a:rPr lang="fi-FI" dirty="0" err="1"/>
+              <a:t>by</a:t>
+            </a:r>
+            <a:r>
+              <a:rPr lang="fi-FI" dirty="0"/>
+              <a:t> </a:t>
+            </a:r>
+            <a:r>
+              <a:rPr lang="fi-FI" dirty="0" err="1"/>
+              <a:t>editing</a:t>
+            </a:r>
+            <a:r>
+              <a:rPr lang="fi-FI" dirty="0"/>
+              <a:t> </a:t>
+            </a:r>
+            <a:r>
+              <a:rPr lang="fi-FI" dirty="0" err="1"/>
+              <a:t>the</a:t>
+            </a:r>
+            <a:r>
+              <a:rPr lang="fi-FI" dirty="0"/>
+              <a:t> </a:t>
+            </a:r>
+            <a:r>
+              <a:rPr lang="fi-FI" dirty="0" err="1"/>
+              <a:t>parameters</a:t>
+            </a:r>
+            <a:r>
+              <a:rPr lang="fi-FI" dirty="0"/>
+              <a:t> of </a:t>
+            </a:r>
+            <a:r>
+              <a:rPr lang="fi-FI" dirty="0" err="1"/>
+              <a:t>the</a:t>
+            </a:r>
+            <a:r>
+              <a:rPr lang="fi-FI" dirty="0"/>
+              <a:t> </a:t>
+            </a:r>
+            <a:r>
+              <a:rPr lang="fi-FI" dirty="0" err="1"/>
+              <a:t>request</a:t>
+            </a:r>
+            <a:r>
+              <a:rPr lang="fi-FI" dirty="0"/>
+              <a:t> to </a:t>
+            </a:r>
+            <a:r>
+              <a:rPr lang="fi-FI" dirty="0" err="1"/>
+              <a:t>the</a:t>
+            </a:r>
+            <a:r>
+              <a:rPr lang="fi-FI" dirty="0"/>
+              <a:t> </a:t>
+            </a:r>
+            <a:r>
+              <a:rPr lang="fi-FI" dirty="0" err="1"/>
+              <a:t>Jetty</a:t>
+            </a:r>
+            <a:r>
+              <a:rPr lang="fi-FI" dirty="0"/>
+              <a:t> Web Server</a:t>
+            </a:r>
+          </a:p>
+          <a:p>
+            <a:pPr marL="0" indent="0">
+              <a:buNone/>
+            </a:pPr>
+            <a:endParaRPr lang="fi-FI" dirty="0"/>
           </a:p>
         </p:txBody>
       </p:sp>
@@ -5019,6 +5465,690 @@
       </p:grpSpPr>
       <p:sp>
         <p:nvSpPr>
+          <p:cNvPr id="2" name="Otsikko 1">
+            <a:extLst>
+              <a:ext uri="{FF2B5EF4-FFF2-40B4-BE49-F238E27FC236}">
+                <a16:creationId xmlns:a16="http://schemas.microsoft.com/office/drawing/2014/main" id="{C1677EB3-7152-42D6-AC05-412D9EB60E50}"/>
+              </a:ext>
+            </a:extLst>
+          </p:cNvPr>
+          <p:cNvSpPr>
+            <a:spLocks noGrp="1"/>
+          </p:cNvSpPr>
+          <p:nvPr>
+            <p:ph type="title"/>
+          </p:nvPr>
+        </p:nvSpPr>
+        <p:spPr/>
+        <p:txBody>
+          <a:bodyPr/>
+          <a:lstStyle/>
+          <a:p>
+            <a:r>
+              <a:rPr lang="fi-FI" dirty="0" err="1"/>
+              <a:t>Task</a:t>
+            </a:r>
+            <a:r>
+              <a:rPr lang="fi-FI" dirty="0"/>
+              <a:t> 2.1: API</a:t>
+            </a:r>
+          </a:p>
+        </p:txBody>
+      </p:sp>
+      <p:graphicFrame>
+        <p:nvGraphicFramePr>
+          <p:cNvPr id="5" name="Sisällön paikkamerkki 4">
+            <a:extLst>
+              <a:ext uri="{FF2B5EF4-FFF2-40B4-BE49-F238E27FC236}">
+                <a16:creationId xmlns:a16="http://schemas.microsoft.com/office/drawing/2014/main" id="{4178E7CF-4CCD-4ED1-A024-85640C839616}"/>
+              </a:ext>
+            </a:extLst>
+          </p:cNvPr>
+          <p:cNvGraphicFramePr>
+            <a:graphicFrameLocks noGrp="1"/>
+          </p:cNvGraphicFramePr>
+          <p:nvPr>
+            <p:ph idx="1"/>
+            <p:extLst>
+              <p:ext uri="{D42A27DB-BD31-4B8C-83A1-F6EECF244321}">
+                <p14:modId xmlns:p14="http://schemas.microsoft.com/office/powerpoint/2010/main" val="2016932250"/>
+              </p:ext>
+            </p:extLst>
+          </p:nvPr>
+        </p:nvGraphicFramePr>
+        <p:xfrm>
+          <a:off x="1096963" y="1846263"/>
+          <a:ext cx="10058400" cy="3205480"/>
+        </p:xfrm>
+        <a:graphic>
+          <a:graphicData uri="http://schemas.openxmlformats.org/drawingml/2006/table">
+            <a:tbl>
+              <a:tblPr firstRow="1" bandRow="1">
+                <a:tableStyleId>{3B4B98B0-60AC-42C2-AFA5-B58CD77FA1E5}</a:tableStyleId>
+              </a:tblPr>
+              <a:tblGrid>
+                <a:gridCol w="2011680">
+                  <a:extLst>
+                    <a:ext uri="{9D8B030D-6E8A-4147-A177-3AD203B41FA5}">
+                      <a16:colId xmlns:a16="http://schemas.microsoft.com/office/drawing/2014/main" val="1993197755"/>
+                    </a:ext>
+                  </a:extLst>
+                </a:gridCol>
+                <a:gridCol w="1547247">
+                  <a:extLst>
+                    <a:ext uri="{9D8B030D-6E8A-4147-A177-3AD203B41FA5}">
+                      <a16:colId xmlns:a16="http://schemas.microsoft.com/office/drawing/2014/main" val="820797706"/>
+                    </a:ext>
+                  </a:extLst>
+                </a:gridCol>
+                <a:gridCol w="1912690">
+                  <a:extLst>
+                    <a:ext uri="{9D8B030D-6E8A-4147-A177-3AD203B41FA5}">
+                      <a16:colId xmlns:a16="http://schemas.microsoft.com/office/drawing/2014/main" val="1109499023"/>
+                    </a:ext>
+                  </a:extLst>
+                </a:gridCol>
+                <a:gridCol w="2575103">
+                  <a:extLst>
+                    <a:ext uri="{9D8B030D-6E8A-4147-A177-3AD203B41FA5}">
+                      <a16:colId xmlns:a16="http://schemas.microsoft.com/office/drawing/2014/main" val="4253124287"/>
+                    </a:ext>
+                  </a:extLst>
+                </a:gridCol>
+                <a:gridCol w="2011680">
+                  <a:extLst>
+                    <a:ext uri="{9D8B030D-6E8A-4147-A177-3AD203B41FA5}">
+                      <a16:colId xmlns:a16="http://schemas.microsoft.com/office/drawing/2014/main" val="3759713014"/>
+                    </a:ext>
+                  </a:extLst>
+                </a:gridCol>
+              </a:tblGrid>
+              <a:tr h="370840">
+                <a:tc>
+                  <a:txBody>
+                    <a:bodyPr/>
+                    <a:lstStyle/>
+                    <a:p>
+                      <a:r>
+                        <a:rPr lang="fi-FI" dirty="0" err="1"/>
+                        <a:t>path</a:t>
+                      </a:r>
+                      <a:endParaRPr lang="fi-FI" dirty="0"/>
+                    </a:p>
+                  </a:txBody>
+                  <a:tcPr/>
+                </a:tc>
+                <a:tc>
+                  <a:txBody>
+                    <a:bodyPr/>
+                    <a:lstStyle/>
+                    <a:p>
+                      <a:r>
+                        <a:rPr lang="fi-FI" dirty="0" err="1"/>
+                        <a:t>method</a:t>
+                      </a:r>
+                      <a:endParaRPr lang="fi-FI" dirty="0"/>
+                    </a:p>
+                  </a:txBody>
+                  <a:tcPr/>
+                </a:tc>
+                <a:tc>
+                  <a:txBody>
+                    <a:bodyPr/>
+                    <a:lstStyle/>
+                    <a:p>
+                      <a:r>
+                        <a:rPr lang="fi-FI" dirty="0" err="1"/>
+                        <a:t>parameters</a:t>
+                      </a:r>
+                      <a:endParaRPr lang="fi-FI" dirty="0"/>
+                    </a:p>
+                  </a:txBody>
+                  <a:tcPr/>
+                </a:tc>
+                <a:tc>
+                  <a:txBody>
+                    <a:bodyPr/>
+                    <a:lstStyle/>
+                    <a:p>
+                      <a:r>
+                        <a:rPr lang="fi-FI" dirty="0" err="1"/>
+                        <a:t>response</a:t>
+                      </a:r>
+                      <a:endParaRPr lang="fi-FI" dirty="0"/>
+                    </a:p>
+                  </a:txBody>
+                  <a:tcPr/>
+                </a:tc>
+                <a:tc>
+                  <a:txBody>
+                    <a:bodyPr/>
+                    <a:lstStyle/>
+                    <a:p>
+                      <a:r>
+                        <a:rPr lang="fi-FI" dirty="0" err="1"/>
+                        <a:t>failures</a:t>
+                      </a:r>
+                      <a:endParaRPr lang="fi-FI" dirty="0"/>
+                    </a:p>
+                  </a:txBody>
+                  <a:tcPr/>
+                </a:tc>
+                <a:extLst>
+                  <a:ext uri="{0D108BD9-81ED-4DB2-BD59-A6C34878D82A}">
+                    <a16:rowId xmlns:a16="http://schemas.microsoft.com/office/drawing/2014/main" val="2770040217"/>
+                  </a:ext>
+                </a:extLst>
+              </a:tr>
+              <a:tr h="370840">
+                <a:tc>
+                  <a:txBody>
+                    <a:bodyPr/>
+                    <a:lstStyle/>
+                    <a:p>
+                      <a:r>
+                        <a:rPr lang="fi-FI" dirty="0"/>
+                        <a:t>/</a:t>
+                      </a:r>
+                      <a:r>
+                        <a:rPr lang="fi-FI" dirty="0" err="1"/>
+                        <a:t>getFullName</a:t>
+                      </a:r>
+                      <a:endParaRPr lang="fi-FI" dirty="0"/>
+                    </a:p>
+                  </a:txBody>
+                  <a:tcPr/>
+                </a:tc>
+                <a:tc>
+                  <a:txBody>
+                    <a:bodyPr/>
+                    <a:lstStyle/>
+                    <a:p>
+                      <a:r>
+                        <a:rPr lang="fi-FI" dirty="0"/>
+                        <a:t>GET and POST</a:t>
+                      </a:r>
+                    </a:p>
+                  </a:txBody>
+                  <a:tcPr/>
+                </a:tc>
+                <a:tc>
+                  <a:txBody>
+                    <a:bodyPr/>
+                    <a:lstStyle/>
+                    <a:p>
+                      <a:r>
+                        <a:rPr lang="fi-FI" dirty="0" err="1"/>
+                        <a:t>gender</a:t>
+                      </a:r>
+                      <a:r>
+                        <a:rPr lang="fi-FI" dirty="0"/>
+                        <a:t> (</a:t>
+                      </a:r>
+                      <a:r>
+                        <a:rPr lang="fi-FI" dirty="0" err="1"/>
+                        <a:t>optional</a:t>
+                      </a:r>
+                      <a:r>
+                        <a:rPr lang="fi-FI" dirty="0"/>
+                        <a:t>)</a:t>
+                      </a:r>
+                    </a:p>
+                  </a:txBody>
+                  <a:tcPr/>
+                </a:tc>
+                <a:tc>
+                  <a:txBody>
+                    <a:bodyPr/>
+                    <a:lstStyle/>
+                    <a:p>
+                      <a:r>
+                        <a:rPr lang="fi-FI" dirty="0"/>
+                        <a:t>200 and </a:t>
+                      </a:r>
+                      <a:r>
+                        <a:rPr lang="fi-FI" dirty="0" err="1"/>
+                        <a:t>generated</a:t>
+                      </a:r>
+                      <a:r>
+                        <a:rPr lang="fi-FI" dirty="0"/>
+                        <a:t> </a:t>
+                      </a:r>
+                      <a:r>
+                        <a:rPr lang="fi-FI" dirty="0" err="1"/>
+                        <a:t>name</a:t>
+                      </a:r>
+                      <a:endParaRPr lang="fi-FI" dirty="0"/>
+                    </a:p>
+                  </a:txBody>
+                  <a:tcPr/>
+                </a:tc>
+                <a:tc>
+                  <a:txBody>
+                    <a:bodyPr/>
+                    <a:lstStyle/>
+                    <a:p>
+                      <a:r>
+                        <a:rPr lang="fi-FI" dirty="0"/>
+                        <a:t>400 and an </a:t>
+                      </a:r>
+                      <a:r>
+                        <a:rPr lang="fi-FI" dirty="0" err="1"/>
+                        <a:t>error</a:t>
+                      </a:r>
+                      <a:r>
+                        <a:rPr lang="fi-FI" dirty="0"/>
+                        <a:t> </a:t>
+                      </a:r>
+                      <a:r>
+                        <a:rPr lang="fi-FI" dirty="0" err="1"/>
+                        <a:t>message</a:t>
+                      </a:r>
+                      <a:endParaRPr lang="fi-FI" dirty="0"/>
+                    </a:p>
+                  </a:txBody>
+                  <a:tcPr/>
+                </a:tc>
+                <a:extLst>
+                  <a:ext uri="{0D108BD9-81ED-4DB2-BD59-A6C34878D82A}">
+                    <a16:rowId xmlns:a16="http://schemas.microsoft.com/office/drawing/2014/main" val="1147978990"/>
+                  </a:ext>
+                </a:extLst>
+              </a:tr>
+              <a:tr h="370840">
+                <a:tc>
+                  <a:txBody>
+                    <a:bodyPr/>
+                    <a:lstStyle/>
+                    <a:p>
+                      <a:r>
+                        <a:rPr lang="fi-FI" dirty="0"/>
+                        <a:t>/</a:t>
+                      </a:r>
+                      <a:r>
+                        <a:rPr lang="fi-FI" dirty="0" err="1"/>
+                        <a:t>getFirstName</a:t>
+                      </a:r>
+                      <a:endParaRPr lang="fi-FI" dirty="0"/>
+                    </a:p>
+                  </a:txBody>
+                  <a:tcPr/>
+                </a:tc>
+                <a:tc>
+                  <a:txBody>
+                    <a:bodyPr/>
+                    <a:lstStyle/>
+                    <a:p>
+                      <a:r>
+                        <a:rPr lang="fi-FI" dirty="0"/>
+                        <a:t>GET and POST</a:t>
+                      </a:r>
+                    </a:p>
+                  </a:txBody>
+                  <a:tcPr/>
+                </a:tc>
+                <a:tc>
+                  <a:txBody>
+                    <a:bodyPr/>
+                    <a:lstStyle/>
+                    <a:p>
+                      <a:r>
+                        <a:rPr lang="fi-FI" dirty="0" err="1"/>
+                        <a:t>gender</a:t>
+                      </a:r>
+                      <a:r>
+                        <a:rPr lang="fi-FI" dirty="0"/>
+                        <a:t>, </a:t>
+                      </a:r>
+                      <a:r>
+                        <a:rPr lang="fi-FI" dirty="0" err="1"/>
+                        <a:t>syllableCount</a:t>
+                      </a:r>
+                      <a:r>
+                        <a:rPr lang="fi-FI" dirty="0"/>
+                        <a:t> (</a:t>
+                      </a:r>
+                      <a:r>
+                        <a:rPr lang="fi-FI" dirty="0" err="1"/>
+                        <a:t>both</a:t>
+                      </a:r>
+                      <a:r>
+                        <a:rPr lang="fi-FI" dirty="0"/>
+                        <a:t> </a:t>
+                      </a:r>
+                      <a:r>
+                        <a:rPr lang="fi-FI" dirty="0" err="1"/>
+                        <a:t>optional</a:t>
+                      </a:r>
+                      <a:r>
+                        <a:rPr lang="fi-FI" dirty="0"/>
+                        <a:t>)</a:t>
+                      </a:r>
+                    </a:p>
+                  </a:txBody>
+                  <a:tcPr/>
+                </a:tc>
+                <a:tc>
+                  <a:txBody>
+                    <a:bodyPr/>
+                    <a:lstStyle/>
+                    <a:p>
+                      <a:r>
+                        <a:rPr lang="fi-FI" dirty="0"/>
+                        <a:t>200 and </a:t>
+                      </a:r>
+                      <a:r>
+                        <a:rPr lang="fi-FI" dirty="0" err="1"/>
+                        <a:t>generated</a:t>
+                      </a:r>
+                      <a:r>
+                        <a:rPr lang="fi-FI" dirty="0"/>
+                        <a:t> </a:t>
+                      </a:r>
+                      <a:r>
+                        <a:rPr lang="fi-FI" dirty="0" err="1"/>
+                        <a:t>name</a:t>
+                      </a:r>
+                      <a:endParaRPr lang="fi-FI" dirty="0"/>
+                    </a:p>
+                  </a:txBody>
+                  <a:tcPr/>
+                </a:tc>
+                <a:tc>
+                  <a:txBody>
+                    <a:bodyPr/>
+                    <a:lstStyle/>
+                    <a:p>
+                      <a:r>
+                        <a:rPr lang="fi-FI" dirty="0"/>
+                        <a:t>400 and an </a:t>
+                      </a:r>
+                      <a:r>
+                        <a:rPr lang="fi-FI" dirty="0" err="1"/>
+                        <a:t>error</a:t>
+                      </a:r>
+                      <a:r>
+                        <a:rPr lang="fi-FI" dirty="0"/>
+                        <a:t> </a:t>
+                      </a:r>
+                      <a:r>
+                        <a:rPr lang="fi-FI" dirty="0" err="1"/>
+                        <a:t>message</a:t>
+                      </a:r>
+                      <a:endParaRPr lang="fi-FI" dirty="0"/>
+                    </a:p>
+                  </a:txBody>
+                  <a:tcPr/>
+                </a:tc>
+                <a:extLst>
+                  <a:ext uri="{0D108BD9-81ED-4DB2-BD59-A6C34878D82A}">
+                    <a16:rowId xmlns:a16="http://schemas.microsoft.com/office/drawing/2014/main" val="898697436"/>
+                  </a:ext>
+                </a:extLst>
+              </a:tr>
+              <a:tr h="370840">
+                <a:tc>
+                  <a:txBody>
+                    <a:bodyPr/>
+                    <a:lstStyle/>
+                    <a:p>
+                      <a:r>
+                        <a:rPr lang="fi-FI" dirty="0"/>
+                        <a:t>/</a:t>
+                      </a:r>
+                      <a:r>
+                        <a:rPr lang="fi-FI" dirty="0" err="1"/>
+                        <a:t>getLastName</a:t>
+                      </a:r>
+                      <a:endParaRPr lang="fi-FI" dirty="0"/>
+                    </a:p>
+                  </a:txBody>
+                  <a:tcPr/>
+                </a:tc>
+                <a:tc>
+                  <a:txBody>
+                    <a:bodyPr/>
+                    <a:lstStyle/>
+                    <a:p>
+                      <a:r>
+                        <a:rPr lang="fi-FI" dirty="0"/>
+                        <a:t>GET and POST</a:t>
+                      </a:r>
+                    </a:p>
+                  </a:txBody>
+                  <a:tcPr/>
+                </a:tc>
+                <a:tc>
+                  <a:txBody>
+                    <a:bodyPr/>
+                    <a:lstStyle/>
+                    <a:p>
+                      <a:r>
+                        <a:rPr lang="fi-FI" dirty="0" err="1"/>
+                        <a:t>syllableCount</a:t>
+                      </a:r>
+                      <a:r>
+                        <a:rPr lang="fi-FI" dirty="0"/>
+                        <a:t> (</a:t>
+                      </a:r>
+                      <a:r>
+                        <a:rPr lang="fi-FI" dirty="0" err="1"/>
+                        <a:t>optional</a:t>
+                      </a:r>
+                      <a:r>
+                        <a:rPr lang="fi-FI" dirty="0"/>
+                        <a:t>)</a:t>
+                      </a:r>
+                    </a:p>
+                  </a:txBody>
+                  <a:tcPr/>
+                </a:tc>
+                <a:tc>
+                  <a:txBody>
+                    <a:bodyPr/>
+                    <a:lstStyle/>
+                    <a:p>
+                      <a:r>
+                        <a:rPr lang="fi-FI" dirty="0"/>
+                        <a:t>200 and </a:t>
+                      </a:r>
+                      <a:r>
+                        <a:rPr lang="fi-FI" dirty="0" err="1"/>
+                        <a:t>generated</a:t>
+                      </a:r>
+                      <a:r>
+                        <a:rPr lang="fi-FI" dirty="0"/>
+                        <a:t> </a:t>
+                      </a:r>
+                      <a:r>
+                        <a:rPr lang="fi-FI" dirty="0" err="1"/>
+                        <a:t>name</a:t>
+                      </a:r>
+                      <a:endParaRPr lang="fi-FI" dirty="0"/>
+                    </a:p>
+                  </a:txBody>
+                  <a:tcPr/>
+                </a:tc>
+                <a:tc>
+                  <a:txBody>
+                    <a:bodyPr/>
+                    <a:lstStyle/>
+                    <a:p>
+                      <a:r>
+                        <a:rPr lang="fi-FI" dirty="0"/>
+                        <a:t>400 and an </a:t>
+                      </a:r>
+                      <a:r>
+                        <a:rPr lang="fi-FI" dirty="0" err="1"/>
+                        <a:t>error</a:t>
+                      </a:r>
+                      <a:r>
+                        <a:rPr lang="fi-FI" dirty="0"/>
+                        <a:t> </a:t>
+                      </a:r>
+                      <a:r>
+                        <a:rPr lang="fi-FI" dirty="0" err="1"/>
+                        <a:t>message</a:t>
+                      </a:r>
+                      <a:endParaRPr lang="fi-FI" dirty="0"/>
+                    </a:p>
+                  </a:txBody>
+                  <a:tcPr/>
+                </a:tc>
+                <a:extLst>
+                  <a:ext uri="{0D108BD9-81ED-4DB2-BD59-A6C34878D82A}">
+                    <a16:rowId xmlns:a16="http://schemas.microsoft.com/office/drawing/2014/main" val="2771916110"/>
+                  </a:ext>
+                </a:extLst>
+              </a:tr>
+              <a:tr h="370840">
+                <a:tc>
+                  <a:txBody>
+                    <a:bodyPr/>
+                    <a:lstStyle/>
+                    <a:p>
+                      <a:r>
+                        <a:rPr lang="fi-FI" dirty="0"/>
+                        <a:t>/</a:t>
+                      </a:r>
+                      <a:r>
+                        <a:rPr lang="fi-FI" dirty="0" err="1"/>
+                        <a:t>getNameHistory</a:t>
+                      </a:r>
+                      <a:endParaRPr lang="fi-FI" dirty="0"/>
+                    </a:p>
+                  </a:txBody>
+                  <a:tcPr/>
+                </a:tc>
+                <a:tc>
+                  <a:txBody>
+                    <a:bodyPr/>
+                    <a:lstStyle/>
+                    <a:p>
+                      <a:r>
+                        <a:rPr lang="fi-FI" dirty="0"/>
+                        <a:t>GET and POST</a:t>
+                      </a:r>
+                    </a:p>
+                  </a:txBody>
+                  <a:tcPr/>
+                </a:tc>
+                <a:tc>
+                  <a:txBody>
+                    <a:bodyPr/>
+                    <a:lstStyle/>
+                    <a:p>
+                      <a:r>
+                        <a:rPr lang="fi-FI" dirty="0" err="1"/>
+                        <a:t>none</a:t>
+                      </a:r>
+                      <a:endParaRPr lang="fi-FI" dirty="0"/>
+                    </a:p>
+                  </a:txBody>
+                  <a:tcPr/>
+                </a:tc>
+                <a:tc>
+                  <a:txBody>
+                    <a:bodyPr/>
+                    <a:lstStyle/>
+                    <a:p>
+                      <a:r>
+                        <a:rPr lang="fi-FI" dirty="0" err="1"/>
+                        <a:t>always</a:t>
+                      </a:r>
+                      <a:r>
+                        <a:rPr lang="fi-FI" dirty="0"/>
+                        <a:t> </a:t>
+                      </a:r>
+                      <a:r>
+                        <a:rPr lang="fi-FI" dirty="0" err="1"/>
+                        <a:t>fails</a:t>
+                      </a:r>
+                      <a:endParaRPr lang="fi-FI" dirty="0"/>
+                    </a:p>
+                  </a:txBody>
+                  <a:tcPr/>
+                </a:tc>
+                <a:tc>
+                  <a:txBody>
+                    <a:bodyPr/>
+                    <a:lstStyle/>
+                    <a:p>
+                      <a:r>
+                        <a:rPr lang="fi-FI" dirty="0"/>
+                        <a:t>501 </a:t>
+                      </a:r>
+                      <a:r>
+                        <a:rPr lang="fi-FI" dirty="0" err="1"/>
+                        <a:t>Not</a:t>
+                      </a:r>
+                      <a:r>
+                        <a:rPr lang="fi-FI" dirty="0"/>
+                        <a:t> </a:t>
+                      </a:r>
+                      <a:r>
+                        <a:rPr lang="fi-FI" dirty="0" err="1"/>
+                        <a:t>Implemented</a:t>
+                      </a:r>
+                      <a:endParaRPr lang="fi-FI" dirty="0"/>
+                    </a:p>
+                  </a:txBody>
+                  <a:tcPr/>
+                </a:tc>
+                <a:extLst>
+                  <a:ext uri="{0D108BD9-81ED-4DB2-BD59-A6C34878D82A}">
+                    <a16:rowId xmlns:a16="http://schemas.microsoft.com/office/drawing/2014/main" val="84198703"/>
+                  </a:ext>
+                </a:extLst>
+              </a:tr>
+            </a:tbl>
+          </a:graphicData>
+        </a:graphic>
+      </p:graphicFrame>
+    </p:spTree>
+    <p:extLst>
+      <p:ext uri="{BB962C8B-B14F-4D97-AF65-F5344CB8AC3E}">
+        <p14:creationId xmlns:p14="http://schemas.microsoft.com/office/powerpoint/2010/main" val="1385623930"/>
+      </p:ext>
+    </p:extLst>
+  </p:cSld>
+  <p:clrMapOvr>
+    <a:masterClrMapping/>
+  </p:clrMapOvr>
+  <mc:AlternateContent xmlns:mc="http://schemas.openxmlformats.org/markup-compatibility/2006" xmlns:p14="http://schemas.microsoft.com/office/powerpoint/2010/main">
+    <mc:Choice Requires="p14">
+      <p:transition spd="med" p14:dur="700">
+        <p:fade/>
+      </p:transition>
+    </mc:Choice>
+    <mc:Fallback xmlns="">
+      <p:transition spd="med">
+        <p:fade/>
+      </p:transition>
+    </mc:Fallback>
+  </mc:AlternateContent>
+</p:sld>
+</file>
+
+<file path=ppt/slides/slide4.xml><?xml version="1.0" encoding="utf-8"?>
+<p:sld xmlns:a="http://schemas.openxmlformats.org/drawingml/2006/main" xmlns:r="http://schemas.openxmlformats.org/officeDocument/2006/relationships" xmlns:p="http://schemas.openxmlformats.org/presentationml/2006/main">
+  <p:cSld>
+    <p:spTree>
+      <p:nvGrpSpPr>
+        <p:cNvPr id="1" name=""/>
+        <p:cNvGrpSpPr/>
+        <p:nvPr/>
+      </p:nvGrpSpPr>
+      <p:grpSpPr>
+        <a:xfrm>
+          <a:off x="0" y="0"/>
+          <a:ext cx="0" cy="0"/>
+          <a:chOff x="0" y="0"/>
+          <a:chExt cx="0" cy="0"/>
+        </a:xfrm>
+      </p:grpSpPr>
+      <p:sp>
+        <p:nvSpPr>
           <p:cNvPr id="2" name="Otsikko 1"/>
           <p:cNvSpPr>
             <a:spLocks noGrp="1"/>
@@ -5334,7 +6464,7 @@
 </p:sld>
 </file>
 
-<file path=ppt/slides/slide4.xml><?xml version="1.0" encoding="utf-8"?>
+<file path=ppt/slides/slide5.xml><?xml version="1.0" encoding="utf-8"?>
 <p:sld xmlns:a="http://schemas.openxmlformats.org/drawingml/2006/main" xmlns:r="http://schemas.openxmlformats.org/officeDocument/2006/relationships" xmlns:p="http://schemas.openxmlformats.org/presentationml/2006/main">
   <p:cSld>
     <p:spTree>

</xml_diff>

<commit_message>
Update presentation once more
</commit_message>
<xml_diff>
--- a/Task-2/TIES4560 Task 2.pptx
+++ b/Task-2/TIES4560 Task 2.pptx
@@ -168,12 +168,12 @@
   <pc:docChgLst>
     <pc:chgData name="Rami Pasanen" userId="312aadca14e9d211" providerId="Windows Live" clId="Web-{FF55FC64-9F92-4685-BF27-5D21B3767242}"/>
     <pc:docChg chg="modSld">
-      <pc:chgData name="Rami Pasanen" userId="312aadca14e9d211" providerId="Windows Live" clId="Web-{FF55FC64-9F92-4685-BF27-5D21B3767242}" dt="2018-09-20T07:26:02.683" v="92"/>
+      <pc:chgData name="Rami Pasanen" userId="312aadca14e9d211" providerId="Windows Live" clId="Web-{FF55FC64-9F92-4685-BF27-5D21B3767242}" dt="2018-09-20T07:35:21.490" v="100" actId="20577"/>
       <pc:docMkLst>
         <pc:docMk/>
       </pc:docMkLst>
       <pc:sldChg chg="addSp modSp">
-        <pc:chgData name="Rami Pasanen" userId="312aadca14e9d211" providerId="Windows Live" clId="Web-{FF55FC64-9F92-4685-BF27-5D21B3767242}" dt="2018-09-20T07:26:02.683" v="92"/>
+        <pc:chgData name="Rami Pasanen" userId="312aadca14e9d211" providerId="Windows Live" clId="Web-{FF55FC64-9F92-4685-BF27-5D21B3767242}" dt="2018-09-20T07:35:21.490" v="99" actId="20577"/>
         <pc:sldMkLst>
           <pc:docMk/>
           <pc:sldMk cId="787354707" sldId="259"/>
@@ -234,8 +234,8 @@
             <ac:spMk id="14" creationId="{47103882-D100-45E5-8BB9-9E8AC5464710}"/>
           </ac:spMkLst>
         </pc:spChg>
-        <pc:spChg chg="add">
-          <ac:chgData name="Rami Pasanen" userId="312aadca14e9d211" providerId="Windows Live" clId="Web-{FF55FC64-9F92-4685-BF27-5D21B3767242}" dt="2018-09-20T07:26:02.683" v="92"/>
+        <pc:spChg chg="add mod">
+          <ac:chgData name="Rami Pasanen" userId="312aadca14e9d211" providerId="Windows Live" clId="Web-{FF55FC64-9F92-4685-BF27-5D21B3767242}" dt="2018-09-20T07:35:21.490" v="99" actId="20577"/>
           <ac:spMkLst>
             <pc:docMk/>
             <pc:sldMk cId="787354707" sldId="259"/>
@@ -6080,7 +6080,7 @@
         </p:nvSpPr>
         <p:spPr>
           <a:xfrm>
-            <a:off x="5860211" y="4343400"/>
+            <a:off x="6133381" y="5479211"/>
             <a:ext cx="2743200" cy="369332"/>
           </a:xfrm>
           <a:prstGeom prst="rect">
@@ -6099,8 +6099,9 @@
             <a:pPr algn="ctr"/>
             <a:r>
               <a:rPr lang="en-US"/>
-              <a:t>Click to add text</a:t>
-            </a:r>
+              <a:t>responsea</a:t>
+            </a:r>
+            <a:endParaRPr lang="en-US" dirty="0"/>
           </a:p>
         </p:txBody>
       </p:sp>

</xml_diff>